<commit_message>
quick hack for username
</commit_message>
<xml_diff>
--- a/documents/ppt/minesweeper_ppt.pptx
+++ b/documents/ppt/minesweeper_ppt.pptx
@@ -2619,7 +2619,11 @@
         <a:p>
           <a:r>
             <a:rPr lang="en-IN" dirty="0"/>
-            <a:t>Guided By – Mr. Manoj </a:t>
+            <a:t>Guided </a:t>
+          </a:r>
+          <a:r>
+            <a:rPr lang="en-IN"/>
+            <a:t>By – Manoj </a:t>
           </a:r>
           <a:r>
             <a:rPr lang="en-IN" dirty="0" err="1"/>
@@ -3668,23 +3672,7 @@
                 <a:schemeClr val="tx1"/>
               </a:solidFill>
             </a:rPr>
-            <a:t>HTML, CSS, </a:t>
-          </a:r>
-          <a:r>
-            <a:rPr lang="en-IN" dirty="0" err="1">
-              <a:solidFill>
-                <a:schemeClr val="tx1"/>
-              </a:solidFill>
-            </a:rPr>
-            <a:t>JavaScript,JSON</a:t>
-          </a:r>
-          <a:r>
-            <a:rPr lang="en-IN" dirty="0">
-              <a:solidFill>
-                <a:schemeClr val="tx1"/>
-              </a:solidFill>
-            </a:rPr>
-            <a:t> (Front-End)</a:t>
+            <a:t>HTML, CSS, JavaScript, JSON (Front-End)</a:t>
           </a:r>
           <a:endParaRPr lang="en-US" dirty="0">
             <a:solidFill>
@@ -4100,7 +4088,11 @@
           </a:pPr>
           <a:r>
             <a:rPr lang="en-IN" sz="2600" kern="1200" dirty="0"/>
-            <a:t>Guided By – Mr. Manoj </a:t>
+            <a:t>Guided </a:t>
+          </a:r>
+          <a:r>
+            <a:rPr lang="en-IN" sz="2600" kern="1200"/>
+            <a:t>By – Manoj </a:t>
           </a:r>
           <a:r>
             <a:rPr lang="en-IN" sz="2600" kern="1200" dirty="0" err="1"/>
@@ -5683,23 +5675,7 @@
                 <a:schemeClr val="tx1"/>
               </a:solidFill>
             </a:rPr>
-            <a:t>HTML, CSS, </a:t>
-          </a:r>
-          <a:r>
-            <a:rPr lang="en-IN" sz="2000" kern="1200" dirty="0" err="1">
-              <a:solidFill>
-                <a:schemeClr val="tx1"/>
-              </a:solidFill>
-            </a:rPr>
-            <a:t>JavaScript,JSON</a:t>
-          </a:r>
-          <a:r>
-            <a:rPr lang="en-IN" sz="2000" kern="1200" dirty="0">
-              <a:solidFill>
-                <a:schemeClr val="tx1"/>
-              </a:solidFill>
-            </a:rPr>
-            <a:t> (Front-End)</a:t>
+            <a:t>HTML, CSS, JavaScript, JSON (Front-End)</a:t>
           </a:r>
           <a:endParaRPr lang="en-US" sz="2000" kern="1200" dirty="0">
             <a:solidFill>
@@ -17849,7 +17825,7 @@
           <p:nvPr>
             <p:extLst>
               <p:ext uri="{D42A27DB-BD31-4B8C-83A1-F6EECF244321}">
-                <p14:modId xmlns:p14="http://schemas.microsoft.com/office/powerpoint/2010/main" val="99362477"/>
+                <p14:modId xmlns:p14="http://schemas.microsoft.com/office/powerpoint/2010/main" val="1615788459"/>
               </p:ext>
             </p:extLst>
           </p:nvPr>
@@ -18218,7 +18194,7 @@
             <p:ph idx="1"/>
             <p:extLst>
               <p:ext uri="{D42A27DB-BD31-4B8C-83A1-F6EECF244321}">
-                <p14:modId xmlns:p14="http://schemas.microsoft.com/office/powerpoint/2010/main" val="2736810089"/>
+                <p14:modId xmlns:p14="http://schemas.microsoft.com/office/powerpoint/2010/main" val="2700607395"/>
               </p:ext>
             </p:extLst>
           </p:nvPr>

</xml_diff>

<commit_message>
updated ppt to include future releases.
</commit_message>
<xml_diff>
--- a/documents/ppt/minesweeper_ppt.pptx
+++ b/documents/ppt/minesweeper_ppt.pptx
@@ -18594,7 +18594,7 @@
         <p:spPr>
           <a:xfrm>
             <a:off x="1955325" y="1271838"/>
-            <a:ext cx="8281350" cy="4314324"/>
+            <a:ext cx="8281350" cy="5586162"/>
           </a:xfrm>
         </p:spPr>
         <p:txBody>
@@ -18732,7 +18732,16 @@
               <a:rPr lang="en-US" dirty="0"/>
               <a:t>for validation</a:t>
             </a:r>
-            <a:endParaRPr lang="en-US" sz="1800" b="0" i="0" u="none" strike="noStrike" baseline="0" dirty="0"/>
+          </a:p>
+          <a:p>
+            <a:pPr lvl="1">
+              <a:buFont typeface="Wingdings" panose="05000000000000000000" pitchFamily="2" charset="2"/>
+              <a:buChar char="Ø"/>
+            </a:pPr>
+            <a:r>
+              <a:rPr lang="en-US" sz="1800" b="0" i="0" u="none" strike="noStrike" baseline="0" dirty="0"/>
+              <a:t>Delete Account</a:t>
+            </a:r>
           </a:p>
         </p:txBody>
       </p:sp>

</xml_diff>